<commit_message>
Add period to description of Fig 1.
Everything else is perfect. Bombs away!
</commit_message>
<xml_diff>
--- a/mapping_project-poster_TO_REVIEW_ESME.pptx
+++ b/mapping_project-poster_TO_REVIEW_ESME.pptx
@@ -197,7 +197,7 @@
           <a:p>
             <a:fld id="{0E5820E2-07A4-7E46-B940-ED06D469D0A9}" type="datetimeFigureOut">
               <a:rPr lang="en-NL" smtClean="0"/>
-              <a:t>02/01/2021</a:t>
+              <a:t>2/1/21</a:t>
             </a:fld>
             <a:endParaRPr lang="en-NL"/>
           </a:p>
@@ -356,7 +356,7 @@
           <a:p>
             <a:fld id="{01B03D1D-E699-7A42-AAF2-6CB121A05637}" type="slidenum">
               <a:rPr lang="en-NL" smtClean="0"/>
-              <a:t>‹Nr.›</a:t>
+              <a:t>‹#›</a:t>
             </a:fld>
             <a:endParaRPr lang="en-NL"/>
           </a:p>
@@ -3148,7 +3148,14 @@
                 <a:latin typeface="Roboto Condensed Light" pitchFamily="2" charset="0"/>
                 <a:ea typeface="Roboto Condensed Light" pitchFamily="2" charset="0"/>
               </a:rPr>
-              <a:t>Fig. 1 Search terms visualized by icons</a:t>
+              <a:t>Fig. 1 Search terms visualized </a:t>
+            </a:r>
+            <a:r>
+              <a:rPr lang="en-US" i="1">
+                <a:latin typeface="Roboto Condensed Light" pitchFamily="2" charset="0"/>
+                <a:ea typeface="Roboto Condensed Light" pitchFamily="2" charset="0"/>
+              </a:rPr>
+              <a:t>by icons.</a:t>
             </a:r>
             <a:endParaRPr lang="de-AT" i="1" dirty="0">
               <a:latin typeface="Roboto Condensed Light" pitchFamily="2" charset="0"/>

</xml_diff>